<commit_message>
Updated slides with what was presented
</commit_message>
<xml_diff>
--- a/Presentations/TeamQuicksilver_Game_Pitch_Su15.pptx
+++ b/Presentations/TeamQuicksilver_Game_Pitch_Su15.pptx
@@ -124,7 +124,7 @@
   </p:defaultTextStyle>
   <p:extLst>
     <p:ext uri="{EFAFB233-063F-42B5-8137-9DF3F51BA10A}">
-      <p15:sldGuideLst xmlns:p15="http://schemas.microsoft.com/office/powerpoint/2012/main">
+      <p15:sldGuideLst xmlns:p15="http://schemas.microsoft.com/office/powerpoint/2012/main" xmlns="">
         <p15:guide id="1" orient="horz" pos="2160">
           <p15:clr>
             <a:srgbClr val="A4A3A4"/>
@@ -138,7 +138,7 @@
       </p15:sldGuideLst>
     </p:ext>
     <p:ext uri="{2D200454-40CA-4A62-9FC3-DE9A4176ACB9}">
-      <p15:notesGuideLst xmlns:p15="http://schemas.microsoft.com/office/powerpoint/2012/main">
+      <p15:notesGuideLst xmlns:p15="http://schemas.microsoft.com/office/powerpoint/2012/main" xmlns="">
         <p15:guide id="1" orient="horz" pos="2880">
           <p15:clr>
             <a:srgbClr val="A4A3A4"/>
@@ -237,7 +237,7 @@
           <a:p>
             <a:fld id="{FE5B4EDC-59C0-49C7-8ADA-5A781B329E02}" type="datetimeFigureOut">
               <a:rPr lang="en-US"/>
-              <a:t>6/3/2015</a:t>
+              <a:t>6/4/15</a:t>
             </a:fld>
             <a:endParaRPr/>
           </a:p>
@@ -402,7 +402,7 @@
           <a:p>
             <a:fld id="{F2D8D46A-B586-417D-BFBD-8C8FE0AAF762}" type="datetimeFigureOut">
               <a:rPr lang="en-US"/>
-              <a:t>6/3/2015</a:t>
+              <a:t>6/4/15</a:t>
             </a:fld>
             <a:endParaRPr/>
           </a:p>
@@ -700,14 +700,14 @@
           <a:noFill/>
           <a:ln/>
           <a:extLst>
-            <a:ext uri="{909E8E84-426E-40DD-AFC4-6F175D3DCCD1}">
+            <a:ext uri="{909E8E84-426E-40dd-AFC4-6F175D3DCCD1}">
               <a14:hiddenFill xmlns:a14="http://schemas.microsoft.com/office/drawing/2010/main">
                 <a:solidFill>
                   <a:srgbClr val="FFFFFF"/>
                 </a:solidFill>
               </a14:hiddenFill>
             </a:ext>
-            <a:ext uri="{91240B29-F687-4F45-9708-019B960494DF}">
+            <a:ext uri="{91240B29-F687-4f45-9708-019B960494DF}">
               <a14:hiddenLine xmlns:a14="http://schemas.microsoft.com/office/drawing/2010/main" w="9525">
                 <a:solidFill>
                   <a:srgbClr val="000000"/>
@@ -842,7 +842,7 @@
         <p:nvSpPr>
           <p:cNvPr id="8195" name="Rectangle 2"/>
           <p:cNvSpPr>
-            <a:spLocks noRot="1" noChangeArrowheads="1" noTextEdit="1"/>
+            <a:spLocks noGrp="1" noRot="1" noChangeAspect="1" noChangeArrowheads="1" noTextEdit="1"/>
           </p:cNvSpPr>
           <p:nvPr>
             <p:ph type="sldImg"/>
@@ -866,14 +866,14 @@
           <a:noFill/>
           <a:ln/>
           <a:extLst>
-            <a:ext uri="{909E8E84-426E-40DD-AFC4-6F175D3DCCD1}">
+            <a:ext uri="{909E8E84-426E-40dd-AFC4-6F175D3DCCD1}">
               <a14:hiddenFill xmlns:a14="http://schemas.microsoft.com/office/drawing/2010/main">
                 <a:solidFill>
                   <a:srgbClr val="FFFFFF"/>
                 </a:solidFill>
               </a14:hiddenFill>
             </a:ext>
-            <a:ext uri="{91240B29-F687-4F45-9708-019B960494DF}">
+            <a:ext uri="{91240B29-F687-4f45-9708-019B960494DF}">
               <a14:hiddenLine xmlns:a14="http://schemas.microsoft.com/office/drawing/2010/main" w="9525">
                 <a:solidFill>
                   <a:srgbClr val="000000"/>
@@ -1665,7 +1665,7 @@
           <a:p>
             <a:fld id="{F0DFD029-FB74-4578-B929-F66AA97659CA}" type="datetimeFigureOut">
               <a:rPr lang="en-US"/>
-              <a:t>6/3/2015</a:t>
+              <a:t>6/4/15</a:t>
             </a:fld>
             <a:endParaRPr/>
           </a:p>
@@ -1738,7 +1738,7 @@
   <p:timing>
     <p:tnLst>
       <p:par>
-        <p:cTn id="1" dur="indefinite" restart="never" nodeType="tmRoot"/>
+        <p:cTn xmlns:p14="http://schemas.microsoft.com/office/powerpoint/2010/main" id="1" dur="indefinite" restart="never" nodeType="tmRoot"/>
       </p:par>
     </p:tnLst>
   </p:timing>
@@ -1870,7 +1870,7 @@
           <a:p>
             <a:fld id="{F0DFD029-FB74-4578-B929-F66AA97659CA}" type="datetimeFigureOut">
               <a:rPr lang="en-US"/>
-              <a:t>6/3/2015</a:t>
+              <a:t>6/4/15</a:t>
             </a:fld>
             <a:endParaRPr/>
           </a:p>
@@ -1943,7 +1943,7 @@
   <p:timing>
     <p:tnLst>
       <p:par>
-        <p:cTn id="1" dur="indefinite" restart="never" nodeType="tmRoot"/>
+        <p:cTn xmlns:p14="http://schemas.microsoft.com/office/powerpoint/2010/main" id="1" dur="indefinite" restart="never" nodeType="tmRoot"/>
       </p:par>
     </p:tnLst>
   </p:timing>
@@ -2085,7 +2085,7 @@
           <a:p>
             <a:fld id="{F0DFD029-FB74-4578-B929-F66AA97659CA}" type="datetimeFigureOut">
               <a:rPr lang="en-US"/>
-              <a:t>6/3/2015</a:t>
+              <a:t>6/4/15</a:t>
             </a:fld>
             <a:endParaRPr/>
           </a:p>
@@ -2158,7 +2158,7 @@
   <p:timing>
     <p:tnLst>
       <p:par>
-        <p:cTn id="1" dur="indefinite" restart="never" nodeType="tmRoot"/>
+        <p:cTn xmlns:p14="http://schemas.microsoft.com/office/powerpoint/2010/main" id="1" dur="indefinite" restart="never" nodeType="tmRoot"/>
       </p:par>
     </p:tnLst>
   </p:timing>
@@ -2290,7 +2290,7 @@
           <a:p>
             <a:fld id="{F0DFD029-FB74-4578-B929-F66AA97659CA}" type="datetimeFigureOut">
               <a:rPr lang="en-US"/>
-              <a:t>6/3/2015</a:t>
+              <a:t>6/4/15</a:t>
             </a:fld>
             <a:endParaRPr/>
           </a:p>
@@ -2363,7 +2363,7 @@
   <p:timing>
     <p:tnLst>
       <p:par>
-        <p:cTn id="1" dur="indefinite" restart="never" nodeType="tmRoot"/>
+        <p:cTn xmlns:p14="http://schemas.microsoft.com/office/powerpoint/2010/main" id="1" dur="indefinite" restart="never" nodeType="tmRoot"/>
       </p:par>
     </p:tnLst>
   </p:timing>
@@ -2560,7 +2560,7 @@
           <a:p>
             <a:fld id="{F0DFD029-FB74-4578-B929-F66AA97659CA}" type="datetimeFigureOut">
               <a:rPr lang="en-US"/>
-              <a:t>6/3/2015</a:t>
+              <a:t>6/4/15</a:t>
             </a:fld>
             <a:endParaRPr/>
           </a:p>
@@ -2802,7 +2802,7 @@
   <p:timing>
     <p:tnLst>
       <p:par>
-        <p:cTn id="1" dur="indefinite" restart="never" nodeType="tmRoot"/>
+        <p:cTn xmlns:p14="http://schemas.microsoft.com/office/powerpoint/2010/main" id="1" dur="indefinite" restart="never" nodeType="tmRoot"/>
       </p:par>
     </p:tnLst>
   </p:timing>
@@ -3040,7 +3040,7 @@
           <a:p>
             <a:fld id="{F0DFD029-FB74-4578-B929-F66AA97659CA}" type="datetimeFigureOut">
               <a:rPr lang="en-US"/>
-              <a:t>6/3/2015</a:t>
+              <a:t>6/4/15</a:t>
             </a:fld>
             <a:endParaRPr/>
           </a:p>
@@ -3113,7 +3113,7 @@
   <p:timing>
     <p:tnLst>
       <p:par>
-        <p:cTn id="1" dur="indefinite" restart="never" nodeType="tmRoot"/>
+        <p:cTn xmlns:p14="http://schemas.microsoft.com/office/powerpoint/2010/main" id="1" dur="indefinite" restart="never" nodeType="tmRoot"/>
       </p:par>
     </p:tnLst>
   </p:timing>
@@ -3503,7 +3503,7 @@
           <a:p>
             <a:fld id="{F0DFD029-FB74-4578-B929-F66AA97659CA}" type="datetimeFigureOut">
               <a:rPr lang="en-US"/>
-              <a:t>6/3/2015</a:t>
+              <a:t>6/4/15</a:t>
             </a:fld>
             <a:endParaRPr/>
           </a:p>
@@ -3576,7 +3576,7 @@
   <p:timing>
     <p:tnLst>
       <p:par>
-        <p:cTn id="1" dur="indefinite" restart="never" nodeType="tmRoot"/>
+        <p:cTn xmlns:p14="http://schemas.microsoft.com/office/powerpoint/2010/main" id="1" dur="indefinite" restart="never" nodeType="tmRoot"/>
       </p:par>
     </p:tnLst>
   </p:timing>
@@ -3640,7 +3640,7 @@
           <a:p>
             <a:fld id="{F0DFD029-FB74-4578-B929-F66AA97659CA}" type="datetimeFigureOut">
               <a:rPr lang="en-US"/>
-              <a:t>6/3/2015</a:t>
+              <a:t>6/4/15</a:t>
             </a:fld>
             <a:endParaRPr/>
           </a:p>
@@ -3713,7 +3713,7 @@
   <p:timing>
     <p:tnLst>
       <p:par>
-        <p:cTn id="1" dur="indefinite" restart="never" nodeType="tmRoot"/>
+        <p:cTn xmlns:p14="http://schemas.microsoft.com/office/powerpoint/2010/main" id="1" dur="indefinite" restart="never" nodeType="tmRoot"/>
       </p:par>
     </p:tnLst>
   </p:timing>
@@ -3754,7 +3754,7 @@
           <a:p>
             <a:fld id="{F0DFD029-FB74-4578-B929-F66AA97659CA}" type="datetimeFigureOut">
               <a:rPr lang="en-US"/>
-              <a:t>6/3/2015</a:t>
+              <a:t>6/4/15</a:t>
             </a:fld>
             <a:endParaRPr/>
           </a:p>
@@ -3827,7 +3827,7 @@
   <p:timing>
     <p:tnLst>
       <p:par>
-        <p:cTn id="1" dur="indefinite" restart="never" nodeType="tmRoot"/>
+        <p:cTn xmlns:p14="http://schemas.microsoft.com/office/powerpoint/2010/main" id="1" dur="indefinite" restart="never" nodeType="tmRoot"/>
       </p:par>
     </p:tnLst>
   </p:timing>
@@ -4060,7 +4060,7 @@
           <a:p>
             <a:fld id="{F0DFD029-FB74-4578-B929-F66AA97659CA}" type="datetimeFigureOut">
               <a:rPr lang="en-US"/>
-              <a:t>6/3/2015</a:t>
+              <a:t>6/4/15</a:t>
             </a:fld>
             <a:endParaRPr/>
           </a:p>
@@ -4133,7 +4133,7 @@
   <p:timing>
     <p:tnLst>
       <p:par>
-        <p:cTn id="1" dur="indefinite" restart="never" nodeType="tmRoot"/>
+        <p:cTn xmlns:p14="http://schemas.microsoft.com/office/powerpoint/2010/main" id="1" dur="indefinite" restart="never" nodeType="tmRoot"/>
       </p:par>
     </p:tnLst>
   </p:timing>
@@ -4355,7 +4355,7 @@
           <a:p>
             <a:fld id="{F0DFD029-FB74-4578-B929-F66AA97659CA}" type="datetimeFigureOut">
               <a:rPr lang="en-US"/>
-              <a:t>6/3/2015</a:t>
+              <a:t>6/4/15</a:t>
             </a:fld>
             <a:endParaRPr/>
           </a:p>
@@ -4428,7 +4428,7 @@
   <p:timing>
     <p:tnLst>
       <p:par>
-        <p:cTn id="1" dur="indefinite" restart="never" nodeType="tmRoot"/>
+        <p:cTn xmlns:p14="http://schemas.microsoft.com/office/powerpoint/2010/main" id="1" dur="indefinite" restart="never" nodeType="tmRoot"/>
       </p:par>
     </p:tnLst>
   </p:timing>
@@ -4985,7 +4985,7 @@
             <a:fld id="{F0DFD029-FB74-4578-B929-F66AA97659CA}" type="datetimeFigureOut">
               <a:rPr lang="en-US"/>
               <a:pPr/>
-              <a:t>6/3/2015</a:t>
+              <a:t>6/4/15</a:t>
             </a:fld>
             <a:endParaRPr/>
           </a:p>
@@ -5106,7 +5106,7 @@
   <p:timing>
     <p:tnLst>
       <p:par>
-        <p:cTn id="1" dur="indefinite" restart="never" nodeType="tmRoot"/>
+        <p:cTn xmlns:p14="http://schemas.microsoft.com/office/powerpoint/2010/main" id="1" dur="indefinite" restart="never" nodeType="tmRoot"/>
       </p:par>
     </p:tnLst>
   </p:timing>
@@ -5428,7 +5428,7 @@
   </p:txStyles>
   <p:extLst>
     <p:ext uri="{27BBF7A9-308A-43DC-89C8-2F10F3537804}">
-      <p15:sldGuideLst xmlns:p15="http://schemas.microsoft.com/office/powerpoint/2012/main">
+      <p15:sldGuideLst xmlns:p15="http://schemas.microsoft.com/office/powerpoint/2012/main" xmlns="">
         <p15:guide id="1" orient="horz" pos="2160" userDrawn="1">
           <p15:clr>
             <a:srgbClr val="F26B43"/>
@@ -5525,18 +5525,18 @@
   <p:clrMapOvr>
     <a:masterClrMapping/>
   </p:clrMapOvr>
-  <mc:AlternateContent xmlns:mc="http://schemas.openxmlformats.org/markup-compatibility/2006">
-    <mc:Choice xmlns:p14="http://schemas.microsoft.com/office/powerpoint/2010/main" Requires="p14">
+  <mc:AlternateContent xmlns:mc="http://schemas.openxmlformats.org/markup-compatibility/2006" xmlns:p14="http://schemas.microsoft.com/office/powerpoint/2010/main">
+    <mc:Choice Requires="p14">
       <p:transition p14:dur="0"/>
     </mc:Choice>
-    <mc:Fallback>
+    <mc:Fallback xmlns="">
       <p:transition/>
     </mc:Fallback>
   </mc:AlternateContent>
   <p:timing>
     <p:tnLst>
       <p:par>
-        <p:cTn id="1" dur="indefinite" restart="never" nodeType="tmRoot"/>
+        <p:cTn xmlns:p14="http://schemas.microsoft.com/office/powerpoint/2010/main" id="1" dur="indefinite" restart="never" nodeType="tmRoot"/>
       </p:par>
     </p:tnLst>
   </p:timing>
@@ -5692,18 +5692,18 @@
   <p:clrMapOvr>
     <a:masterClrMapping/>
   </p:clrMapOvr>
-  <mc:AlternateContent xmlns:mc="http://schemas.openxmlformats.org/markup-compatibility/2006">
-    <mc:Choice xmlns:p14="http://schemas.microsoft.com/office/powerpoint/2010/main" Requires="p14">
+  <mc:AlternateContent xmlns:mc="http://schemas.openxmlformats.org/markup-compatibility/2006" xmlns:p14="http://schemas.microsoft.com/office/powerpoint/2010/main">
+    <mc:Choice Requires="p14">
       <p:transition p14:dur="0"/>
     </mc:Choice>
-    <mc:Fallback>
+    <mc:Fallback xmlns="">
       <p:transition/>
     </mc:Fallback>
   </mc:AlternateContent>
   <p:timing>
     <p:tnLst>
       <p:par>
-        <p:cTn id="1" dur="indefinite" restart="never" nodeType="tmRoot"/>
+        <p:cTn xmlns:p14="http://schemas.microsoft.com/office/powerpoint/2010/main" id="1" dur="indefinite" restart="never" nodeType="tmRoot"/>
       </p:par>
     </p:tnLst>
   </p:timing>
@@ -5842,18 +5842,18 @@
   <p:clrMapOvr>
     <a:masterClrMapping/>
   </p:clrMapOvr>
-  <mc:AlternateContent xmlns:mc="http://schemas.openxmlformats.org/markup-compatibility/2006">
-    <mc:Choice xmlns:p14="http://schemas.microsoft.com/office/powerpoint/2010/main" Requires="p14">
+  <mc:AlternateContent xmlns:mc="http://schemas.openxmlformats.org/markup-compatibility/2006" xmlns:p14="http://schemas.microsoft.com/office/powerpoint/2010/main">
+    <mc:Choice Requires="p14">
       <p:transition p14:dur="0"/>
     </mc:Choice>
-    <mc:Fallback>
+    <mc:Fallback xmlns="">
       <p:transition/>
     </mc:Fallback>
   </mc:AlternateContent>
   <p:timing>
     <p:tnLst>
       <p:par>
-        <p:cTn id="1" dur="indefinite" restart="never" nodeType="tmRoot"/>
+        <p:cTn xmlns:p14="http://schemas.microsoft.com/office/powerpoint/2010/main" id="1" dur="indefinite" restart="never" nodeType="tmRoot"/>
       </p:par>
     </p:tnLst>
   </p:timing>
@@ -5974,12 +5974,12 @@
               <a:t>Design AI </a:t>
             </a:r>
             <a:r>
-              <a:rPr lang="en-US" dirty="0" err="1"/>
-              <a:t>pathing</a:t>
+              <a:rPr lang="en-US" dirty="0" smtClean="0"/>
+              <a:t>to </a:t>
             </a:r>
             <a:r>
               <a:rPr lang="en-US" dirty="0"/>
-              <a:t> to react to player movements and mistakes</a:t>
+              <a:t>react to player movements and mistakes</a:t>
             </a:r>
           </a:p>
           <a:p>
@@ -6032,18 +6032,18 @@
   <p:clrMapOvr>
     <a:masterClrMapping/>
   </p:clrMapOvr>
-  <mc:AlternateContent xmlns:mc="http://schemas.openxmlformats.org/markup-compatibility/2006">
-    <mc:Choice xmlns:p14="http://schemas.microsoft.com/office/powerpoint/2010/main" Requires="p14">
+  <mc:AlternateContent xmlns:mc="http://schemas.openxmlformats.org/markup-compatibility/2006" xmlns:p14="http://schemas.microsoft.com/office/powerpoint/2010/main">
+    <mc:Choice Requires="p14">
       <p:transition p14:dur="0"/>
     </mc:Choice>
-    <mc:Fallback>
+    <mc:Fallback xmlns="">
       <p:transition/>
     </mc:Fallback>
   </mc:AlternateContent>
   <p:timing>
     <p:tnLst>
       <p:par>
-        <p:cTn id="1" dur="indefinite" restart="never" nodeType="tmRoot"/>
+        <p:cTn xmlns:p14="http://schemas.microsoft.com/office/powerpoint/2010/main" id="1" dur="indefinite" restart="never" nodeType="tmRoot"/>
       </p:par>
     </p:tnLst>
   </p:timing>
@@ -6100,18 +6100,18 @@
   <p:clrMapOvr>
     <a:masterClrMapping/>
   </p:clrMapOvr>
-  <mc:AlternateContent xmlns:mc="http://schemas.openxmlformats.org/markup-compatibility/2006">
-    <mc:Choice xmlns:p14="http://schemas.microsoft.com/office/powerpoint/2010/main" Requires="p14">
+  <mc:AlternateContent xmlns:mc="http://schemas.openxmlformats.org/markup-compatibility/2006" xmlns:p14="http://schemas.microsoft.com/office/powerpoint/2010/main">
+    <mc:Choice Requires="p14">
       <p:transition p14:dur="0"/>
     </mc:Choice>
-    <mc:Fallback>
+    <mc:Fallback xmlns="">
       <p:transition/>
     </mc:Fallback>
   </mc:AlternateContent>
   <p:timing>
     <p:tnLst>
       <p:par>
-        <p:cTn id="1" dur="indefinite" restart="never" nodeType="tmRoot"/>
+        <p:cTn xmlns:p14="http://schemas.microsoft.com/office/powerpoint/2010/main" id="1" dur="indefinite" restart="never" nodeType="tmRoot"/>
       </p:par>
     </p:tnLst>
   </p:timing>
@@ -6215,14 +6215,14 @@
             <a:noFill/>
           </a:ln>
           <a:extLst>
-            <a:ext uri="{909E8E84-426E-40DD-AFC4-6F175D3DCCD1}">
+            <a:ext uri="{909E8E84-426E-40dd-AFC4-6F175D3DCCD1}">
               <a14:hiddenFill xmlns:a14="http://schemas.microsoft.com/office/drawing/2010/main">
                 <a:solidFill>
                   <a:srgbClr val="FFFFFF"/>
                 </a:solidFill>
               </a14:hiddenFill>
             </a:ext>
-            <a:ext uri="{91240B29-F687-4F45-9708-019B960494DF}">
+            <a:ext uri="{91240B29-F687-4f45-9708-019B960494DF}">
               <a14:hiddenLine xmlns:a14="http://schemas.microsoft.com/office/drawing/2010/main" w="9525">
                 <a:solidFill>
                   <a:srgbClr val="000000"/>
@@ -6412,14 +6412,14 @@
             <a:noFill/>
           </a:ln>
           <a:extLst>
-            <a:ext uri="{909E8E84-426E-40DD-AFC4-6F175D3DCCD1}">
+            <a:ext uri="{909E8E84-426E-40dd-AFC4-6F175D3DCCD1}">
               <a14:hiddenFill xmlns:a14="http://schemas.microsoft.com/office/drawing/2010/main">
                 <a:solidFill>
                   <a:srgbClr val="FFFFFF"/>
                 </a:solidFill>
               </a14:hiddenFill>
             </a:ext>
-            <a:ext uri="{91240B29-F687-4F45-9708-019B960494DF}">
+            <a:ext uri="{91240B29-F687-4f45-9708-019B960494DF}">
               <a14:hiddenLine xmlns:a14="http://schemas.microsoft.com/office/drawing/2010/main" w="9525">
                 <a:solidFill>
                   <a:srgbClr val="000000"/>
@@ -6614,14 +6614,14 @@
             <a:noFill/>
           </a:ln>
           <a:extLst>
-            <a:ext uri="{909E8E84-426E-40DD-AFC4-6F175D3DCCD1}">
+            <a:ext uri="{909E8E84-426E-40dd-AFC4-6F175D3DCCD1}">
               <a14:hiddenFill xmlns:a14="http://schemas.microsoft.com/office/drawing/2010/main">
                 <a:solidFill>
                   <a:srgbClr val="FFFFFF"/>
                 </a:solidFill>
               </a14:hiddenFill>
             </a:ext>
-            <a:ext uri="{91240B29-F687-4F45-9708-019B960494DF}">
+            <a:ext uri="{91240B29-F687-4f45-9708-019B960494DF}">
               <a14:hiddenLine xmlns:a14="http://schemas.microsoft.com/office/drawing/2010/main" w="9525">
                 <a:solidFill>
                   <a:srgbClr val="000000"/>
@@ -6824,14 +6824,14 @@
             <a:noFill/>
           </a:ln>
           <a:extLst>
-            <a:ext uri="{909E8E84-426E-40DD-AFC4-6F175D3DCCD1}">
+            <a:ext uri="{909E8E84-426E-40dd-AFC4-6F175D3DCCD1}">
               <a14:hiddenFill xmlns:a14="http://schemas.microsoft.com/office/drawing/2010/main">
                 <a:solidFill>
                   <a:srgbClr val="FFFFFF"/>
                 </a:solidFill>
               </a14:hiddenFill>
             </a:ext>
-            <a:ext uri="{91240B29-F687-4F45-9708-019B960494DF}">
+            <a:ext uri="{91240B29-F687-4f45-9708-019B960494DF}">
               <a14:hiddenLine xmlns:a14="http://schemas.microsoft.com/office/drawing/2010/main" w="9525">
                 <a:solidFill>
                   <a:srgbClr val="000000"/>
@@ -6878,14 +6878,14 @@
             <a:noFill/>
           </a:ln>
           <a:extLst>
-            <a:ext uri="{909E8E84-426E-40DD-AFC4-6F175D3DCCD1}">
+            <a:ext uri="{909E8E84-426E-40dd-AFC4-6F175D3DCCD1}">
               <a14:hiddenFill xmlns:a14="http://schemas.microsoft.com/office/drawing/2010/main">
                 <a:solidFill>
                   <a:srgbClr val="FFFFFF"/>
                 </a:solidFill>
               </a14:hiddenFill>
             </a:ext>
-            <a:ext uri="{91240B29-F687-4F45-9708-019B960494DF}">
+            <a:ext uri="{91240B29-F687-4f45-9708-019B960494DF}">
               <a14:hiddenLine xmlns:a14="http://schemas.microsoft.com/office/drawing/2010/main" w="9525">
                 <a:solidFill>
                   <a:srgbClr val="000000"/>
@@ -6932,14 +6932,14 @@
             <a:noFill/>
           </a:ln>
           <a:extLst>
-            <a:ext uri="{909E8E84-426E-40DD-AFC4-6F175D3DCCD1}">
+            <a:ext uri="{909E8E84-426E-40dd-AFC4-6F175D3DCCD1}">
               <a14:hiddenFill xmlns:a14="http://schemas.microsoft.com/office/drawing/2010/main">
                 <a:solidFill>
                   <a:srgbClr val="FFFFFF"/>
                 </a:solidFill>
               </a14:hiddenFill>
             </a:ext>
-            <a:ext uri="{91240B29-F687-4F45-9708-019B960494DF}">
+            <a:ext uri="{91240B29-F687-4f45-9708-019B960494DF}">
               <a14:hiddenLine xmlns:a14="http://schemas.microsoft.com/office/drawing/2010/main" w="9525">
                 <a:solidFill>
                   <a:srgbClr val="000000"/>
@@ -6973,14 +6973,14 @@
             <a:noFill/>
           </a:ln>
           <a:extLst>
-            <a:ext uri="{909E8E84-426E-40DD-AFC4-6F175D3DCCD1}">
+            <a:ext uri="{909E8E84-426E-40dd-AFC4-6F175D3DCCD1}">
               <a14:hiddenFill xmlns:a14="http://schemas.microsoft.com/office/drawing/2010/main">
                 <a:solidFill>
                   <a:srgbClr val="FFFFFF"/>
                 </a:solidFill>
               </a14:hiddenFill>
             </a:ext>
-            <a:ext uri="{91240B29-F687-4F45-9708-019B960494DF}">
+            <a:ext uri="{91240B29-F687-4f45-9708-019B960494DF}">
               <a14:hiddenLine xmlns:a14="http://schemas.microsoft.com/office/drawing/2010/main" w="9525">
                 <a:solidFill>
                   <a:srgbClr val="000000"/>
@@ -7165,18 +7165,18 @@
   <p:clrMapOvr>
     <a:masterClrMapping/>
   </p:clrMapOvr>
-  <mc:AlternateContent xmlns:mc="http://schemas.openxmlformats.org/markup-compatibility/2006">
-    <mc:Choice xmlns:p14="http://schemas.microsoft.com/office/powerpoint/2010/main" Requires="p14">
+  <mc:AlternateContent xmlns:mc="http://schemas.openxmlformats.org/markup-compatibility/2006" xmlns:p14="http://schemas.microsoft.com/office/powerpoint/2010/main">
+    <mc:Choice Requires="p14">
       <p:transition p14:dur="0"/>
     </mc:Choice>
-    <mc:Fallback>
+    <mc:Fallback xmlns="">
       <p:transition/>
     </mc:Fallback>
   </mc:AlternateContent>
   <p:timing>
     <p:tnLst>
       <p:par>
-        <p:cTn id="1" dur="indefinite" restart="never" nodeType="tmRoot"/>
+        <p:cTn xmlns:p14="http://schemas.microsoft.com/office/powerpoint/2010/main" id="1" dur="indefinite" restart="never" nodeType="tmRoot"/>
       </p:par>
     </p:tnLst>
   </p:timing>
@@ -7288,18 +7288,18 @@
   <p:clrMapOvr>
     <a:masterClrMapping/>
   </p:clrMapOvr>
-  <mc:AlternateContent xmlns:mc="http://schemas.openxmlformats.org/markup-compatibility/2006">
-    <mc:Choice xmlns:p14="http://schemas.microsoft.com/office/powerpoint/2010/main" Requires="p14">
+  <mc:AlternateContent xmlns:mc="http://schemas.openxmlformats.org/markup-compatibility/2006" xmlns:p14="http://schemas.microsoft.com/office/powerpoint/2010/main">
+    <mc:Choice Requires="p14">
       <p:transition p14:dur="0"/>
     </mc:Choice>
-    <mc:Fallback>
+    <mc:Fallback xmlns="">
       <p:transition/>
     </mc:Fallback>
   </mc:AlternateContent>
   <p:timing>
     <p:tnLst>
       <p:par>
-        <p:cTn id="1" dur="indefinite" restart="never" nodeType="tmRoot"/>
+        <p:cTn xmlns:p14="http://schemas.microsoft.com/office/powerpoint/2010/main" id="1" dur="indefinite" restart="never" nodeType="tmRoot"/>
       </p:par>
     </p:tnLst>
   </p:timing>
@@ -7344,7 +7344,6 @@
               <a:rPr lang="en-US" sz="4800" b="1" dirty="0"/>
               <a:t>Formal Elements of the Game</a:t>
             </a:r>
-            <a:endParaRPr lang="en-US" sz="4800" b="1" dirty="0"/>
           </a:p>
         </p:txBody>
       </p:sp>
@@ -7361,7 +7360,7 @@
         <p:spPr/>
         <p:txBody>
           <a:bodyPr>
-            <a:normAutofit/>
+            <a:normAutofit fontScale="70000" lnSpcReduction="20000"/>
           </a:bodyPr>
           <a:lstStyle/>
           <a:p>
@@ -7374,33 +7373,23 @@
           <a:p>
             <a:pPr lvl="1" fontAlgn="base"/>
             <a:r>
-              <a:rPr lang="en-US" sz="3200" dirty="0" smtClean="0"/>
-              <a:t>Navigate to </a:t>
-            </a:r>
-            <a:r>
               <a:rPr lang="en-US" sz="3200" dirty="0"/>
-              <a:t>the end of the </a:t>
-            </a:r>
-            <a:r>
-              <a:rPr lang="en-US" sz="3200" dirty="0" smtClean="0"/>
-              <a:t>level</a:t>
+              <a:t>Navigate to the end of the level</a:t>
             </a:r>
           </a:p>
           <a:p>
             <a:pPr lvl="1" fontAlgn="base"/>
             <a:r>
-              <a:rPr lang="en-US" sz="3200" dirty="0" smtClean="0"/>
+              <a:rPr lang="en-US" sz="3200" dirty="0"/>
               <a:t>Avoid enemy detection and eliminate enemies before they can eliminate you</a:t>
             </a:r>
-            <a:endParaRPr lang="en-US" sz="3200" dirty="0"/>
           </a:p>
           <a:p>
             <a:pPr fontAlgn="base"/>
             <a:r>
-              <a:rPr lang="en-US" sz="3600" dirty="0" smtClean="0"/>
+              <a:rPr lang="en-US" sz="3600" dirty="0"/>
               <a:t>Restrictions</a:t>
             </a:r>
-            <a:endParaRPr lang="en-US" sz="3600" dirty="0"/>
           </a:p>
           <a:p>
             <a:pPr lvl="1" fontAlgn="base"/>
@@ -7424,7 +7413,40 @@
             </a:r>
           </a:p>
           <a:p>
-            <a:endParaRPr lang="en-US" dirty="0"/>
+            <a:pPr fontAlgn="base"/>
+            <a:r>
+              <a:rPr lang="en-US" sz="3600" dirty="0" smtClean="0"/>
+              <a:t>Procedures</a:t>
+            </a:r>
+          </a:p>
+          <a:p>
+            <a:pPr lvl="1" fontAlgn="base"/>
+            <a:r>
+              <a:rPr lang="en-US" sz="3200" dirty="0" smtClean="0"/>
+              <a:t>Starting: Introduction of basic mechanics and simple enemies</a:t>
+            </a:r>
+          </a:p>
+          <a:p>
+            <a:pPr lvl="1" fontAlgn="base"/>
+            <a:r>
+              <a:rPr lang="en-US" sz="3200" dirty="0" smtClean="0"/>
+              <a:t>Progression: More mechanics, harder levels, increasingly complex enemies</a:t>
+            </a:r>
+          </a:p>
+          <a:p>
+            <a:pPr lvl="1" fontAlgn="base"/>
+            <a:r>
+              <a:rPr lang="en-US" sz="3200" dirty="0" smtClean="0"/>
+              <a:t>Special: Abilities that can be activated using a limited resource</a:t>
+            </a:r>
+          </a:p>
+          <a:p>
+            <a:pPr lvl="1" fontAlgn="base"/>
+            <a:r>
+              <a:rPr lang="en-US" sz="3200" dirty="0" smtClean="0"/>
+              <a:t>Resolving: Beating all levels</a:t>
+            </a:r>
+            <a:endParaRPr lang="en-US" sz="3200" dirty="0" smtClean="0"/>
           </a:p>
         </p:txBody>
       </p:sp>
@@ -7438,18 +7460,18 @@
   <p:clrMapOvr>
     <a:masterClrMapping/>
   </p:clrMapOvr>
-  <mc:AlternateContent xmlns:mc="http://schemas.openxmlformats.org/markup-compatibility/2006">
-    <mc:Choice xmlns:p14="http://schemas.microsoft.com/office/powerpoint/2010/main" Requires="p14">
+  <mc:AlternateContent xmlns:mc="http://schemas.openxmlformats.org/markup-compatibility/2006" xmlns:p14="http://schemas.microsoft.com/office/powerpoint/2010/main">
+    <mc:Choice Requires="p14">
       <p:transition p14:dur="0"/>
     </mc:Choice>
-    <mc:Fallback>
+    <mc:Fallback xmlns="">
       <p:transition/>
     </mc:Fallback>
   </mc:AlternateContent>
   <p:timing>
     <p:tnLst>
       <p:par>
-        <p:cTn id="1" dur="indefinite" restart="never" nodeType="tmRoot"/>
+        <p:cTn xmlns:p14="http://schemas.microsoft.com/office/powerpoint/2010/main" id="1" dur="indefinite" restart="never" nodeType="tmRoot"/>
       </p:par>
     </p:tnLst>
   </p:timing>
@@ -7531,7 +7553,7 @@
           </a:prstGeom>
           <a:noFill/>
           <a:extLst>
-            <a:ext uri="{909E8E84-426E-40DD-AFC4-6F175D3DCCD1}">
+            <a:ext uri="{909E8E84-426E-40dd-AFC4-6F175D3DCCD1}">
               <a14:hiddenFill xmlns:a14="http://schemas.microsoft.com/office/drawing/2010/main">
                 <a:solidFill>
                   <a:srgbClr val="FFFFFF"/>
@@ -7551,18 +7573,18 @@
   <p:clrMapOvr>
     <a:masterClrMapping/>
   </p:clrMapOvr>
-  <mc:AlternateContent xmlns:mc="http://schemas.openxmlformats.org/markup-compatibility/2006">
-    <mc:Choice xmlns:p14="http://schemas.microsoft.com/office/powerpoint/2010/main" Requires="p14">
+  <mc:AlternateContent xmlns:mc="http://schemas.openxmlformats.org/markup-compatibility/2006" xmlns:p14="http://schemas.microsoft.com/office/powerpoint/2010/main">
+    <mc:Choice Requires="p14">
       <p:transition p14:dur="0"/>
     </mc:Choice>
-    <mc:Fallback>
+    <mc:Fallback xmlns="">
       <p:transition/>
     </mc:Fallback>
   </mc:AlternateContent>
   <p:timing>
     <p:tnLst>
       <p:par>
-        <p:cTn id="1" dur="indefinite" restart="never" nodeType="tmRoot"/>
+        <p:cTn xmlns:p14="http://schemas.microsoft.com/office/powerpoint/2010/main" id="1" dur="indefinite" restart="never" nodeType="tmRoot"/>
       </p:par>
     </p:tnLst>
   </p:timing>
@@ -7644,7 +7666,7 @@
           </a:prstGeom>
           <a:noFill/>
           <a:extLst>
-            <a:ext uri="{909E8E84-426E-40DD-AFC4-6F175D3DCCD1}">
+            <a:ext uri="{909E8E84-426E-40dd-AFC4-6F175D3DCCD1}">
               <a14:hiddenFill xmlns:a14="http://schemas.microsoft.com/office/drawing/2010/main">
                 <a:solidFill>
                   <a:srgbClr val="FFFFFF"/>
@@ -7664,18 +7686,18 @@
   <p:clrMapOvr>
     <a:masterClrMapping/>
   </p:clrMapOvr>
-  <mc:AlternateContent xmlns:mc="http://schemas.openxmlformats.org/markup-compatibility/2006">
-    <mc:Choice xmlns:p14="http://schemas.microsoft.com/office/powerpoint/2010/main" Requires="p14">
+  <mc:AlternateContent xmlns:mc="http://schemas.openxmlformats.org/markup-compatibility/2006" xmlns:p14="http://schemas.microsoft.com/office/powerpoint/2010/main">
+    <mc:Choice Requires="p14">
       <p:transition p14:dur="0"/>
     </mc:Choice>
-    <mc:Fallback>
+    <mc:Fallback xmlns="">
       <p:transition/>
     </mc:Fallback>
   </mc:AlternateContent>
   <p:timing>
     <p:tnLst>
       <p:par>
-        <p:cTn id="1" dur="indefinite" restart="never" nodeType="tmRoot"/>
+        <p:cTn xmlns:p14="http://schemas.microsoft.com/office/powerpoint/2010/main" id="1" dur="indefinite" restart="never" nodeType="tmRoot"/>
       </p:par>
     </p:tnLst>
   </p:timing>
@@ -7755,7 +7777,7 @@
           </a:prstGeom>
           <a:noFill/>
           <a:extLst>
-            <a:ext uri="{909E8E84-426E-40DD-AFC4-6F175D3DCCD1}">
+            <a:ext uri="{909E8E84-426E-40dd-AFC4-6F175D3DCCD1}">
               <a14:hiddenFill xmlns:a14="http://schemas.microsoft.com/office/drawing/2010/main">
                 <a:solidFill>
                   <a:srgbClr val="FFFFFF"/>
@@ -7796,7 +7818,7 @@
           </a:prstGeom>
           <a:noFill/>
           <a:extLst>
-            <a:ext uri="{909E8E84-426E-40DD-AFC4-6F175D3DCCD1}">
+            <a:ext uri="{909E8E84-426E-40dd-AFC4-6F175D3DCCD1}">
               <a14:hiddenFill xmlns:a14="http://schemas.microsoft.com/office/drawing/2010/main">
                 <a:solidFill>
                   <a:srgbClr val="FFFFFF"/>
@@ -7816,18 +7838,18 @@
   <p:clrMapOvr>
     <a:masterClrMapping/>
   </p:clrMapOvr>
-  <mc:AlternateContent xmlns:mc="http://schemas.openxmlformats.org/markup-compatibility/2006">
-    <mc:Choice xmlns:p14="http://schemas.microsoft.com/office/powerpoint/2010/main" Requires="p14">
+  <mc:AlternateContent xmlns:mc="http://schemas.openxmlformats.org/markup-compatibility/2006" xmlns:p14="http://schemas.microsoft.com/office/powerpoint/2010/main">
+    <mc:Choice Requires="p14">
       <p:transition p14:dur="0"/>
     </mc:Choice>
-    <mc:Fallback>
+    <mc:Fallback xmlns="">
       <p:transition/>
     </mc:Fallback>
   </mc:AlternateContent>
   <p:timing>
     <p:tnLst>
       <p:par>
-        <p:cTn id="1" dur="indefinite" restart="never" nodeType="tmRoot"/>
+        <p:cTn xmlns:p14="http://schemas.microsoft.com/office/powerpoint/2010/main" id="1" dur="indefinite" restart="never" nodeType="tmRoot"/>
       </p:par>
     </p:tnLst>
   </p:timing>
@@ -8011,7 +8033,7 @@
           </a:prstGeom>
           <a:noFill/>
           <a:extLst>
-            <a:ext uri="{909E8E84-426E-40DD-AFC4-6F175D3DCCD1}">
+            <a:ext uri="{909E8E84-426E-40dd-AFC4-6F175D3DCCD1}">
               <a14:hiddenFill xmlns:a14="http://schemas.microsoft.com/office/drawing/2010/main">
                 <a:solidFill>
                   <a:srgbClr val="FFFFFF"/>
@@ -8031,18 +8053,18 @@
   <p:clrMapOvr>
     <a:masterClrMapping/>
   </p:clrMapOvr>
-  <mc:AlternateContent xmlns:mc="http://schemas.openxmlformats.org/markup-compatibility/2006">
-    <mc:Choice xmlns:p14="http://schemas.microsoft.com/office/powerpoint/2010/main" Requires="p14">
+  <mc:AlternateContent xmlns:mc="http://schemas.openxmlformats.org/markup-compatibility/2006" xmlns:p14="http://schemas.microsoft.com/office/powerpoint/2010/main">
+    <mc:Choice Requires="p14">
       <p:transition p14:dur="0"/>
     </mc:Choice>
-    <mc:Fallback>
+    <mc:Fallback xmlns="">
       <p:transition/>
     </mc:Fallback>
   </mc:AlternateContent>
   <p:timing>
     <p:tnLst>
       <p:par>
-        <p:cTn id="1" dur="indefinite" restart="never" nodeType="tmRoot"/>
+        <p:cTn xmlns:p14="http://schemas.microsoft.com/office/powerpoint/2010/main" id="1" dur="indefinite" restart="never" nodeType="tmRoot"/>
       </p:par>
     </p:tnLst>
   </p:timing>
@@ -8171,18 +8193,18 @@
   <p:clrMapOvr>
     <a:masterClrMapping/>
   </p:clrMapOvr>
-  <mc:AlternateContent xmlns:mc="http://schemas.openxmlformats.org/markup-compatibility/2006">
-    <mc:Choice xmlns:p14="http://schemas.microsoft.com/office/powerpoint/2010/main" Requires="p14">
+  <mc:AlternateContent xmlns:mc="http://schemas.openxmlformats.org/markup-compatibility/2006" xmlns:p14="http://schemas.microsoft.com/office/powerpoint/2010/main">
+    <mc:Choice Requires="p14">
       <p:transition p14:dur="0"/>
     </mc:Choice>
-    <mc:Fallback>
+    <mc:Fallback xmlns="">
       <p:transition/>
     </mc:Fallback>
   </mc:AlternateContent>
   <p:timing>
     <p:tnLst>
       <p:par>
-        <p:cTn id="1" dur="indefinite" restart="never" nodeType="tmRoot"/>
+        <p:cTn xmlns:p14="http://schemas.microsoft.com/office/powerpoint/2010/main" id="1" dur="indefinite" restart="never" nodeType="tmRoot"/>
       </p:par>
     </p:tnLst>
   </p:timing>

</xml_diff>